<commit_message>
Columbus Code Camp updates
</commit_message>
<xml_diff>
--- a/Living on borrowed time; or Dude, where are the docs.pptx
+++ b/Living on borrowed time; or Dude, where are the docs.pptx
@@ -5,26 +5,27 @@
     <p:sldMasterId id="2147483744" r:id="rId1"/>
   </p:sldMasterIdLst>
   <p:notesMasterIdLst>
-    <p:notesMasterId r:id="rId19"/>
+    <p:notesMasterId r:id="rId20"/>
   </p:notesMasterIdLst>
   <p:sldIdLst>
     <p:sldId id="315" r:id="rId2"/>
     <p:sldId id="258" r:id="rId3"/>
-    <p:sldId id="306" r:id="rId4"/>
-    <p:sldId id="320" r:id="rId5"/>
-    <p:sldId id="307" r:id="rId6"/>
-    <p:sldId id="319" r:id="rId7"/>
-    <p:sldId id="308" r:id="rId8"/>
-    <p:sldId id="316" r:id="rId9"/>
-    <p:sldId id="309" r:id="rId10"/>
-    <p:sldId id="310" r:id="rId11"/>
-    <p:sldId id="311" r:id="rId12"/>
-    <p:sldId id="312" r:id="rId13"/>
-    <p:sldId id="313" r:id="rId14"/>
-    <p:sldId id="314" r:id="rId15"/>
-    <p:sldId id="317" r:id="rId16"/>
-    <p:sldId id="318" r:id="rId17"/>
-    <p:sldId id="305" r:id="rId18"/>
+    <p:sldId id="321" r:id="rId4"/>
+    <p:sldId id="306" r:id="rId5"/>
+    <p:sldId id="320" r:id="rId6"/>
+    <p:sldId id="307" r:id="rId7"/>
+    <p:sldId id="319" r:id="rId8"/>
+    <p:sldId id="308" r:id="rId9"/>
+    <p:sldId id="316" r:id="rId10"/>
+    <p:sldId id="309" r:id="rId11"/>
+    <p:sldId id="310" r:id="rId12"/>
+    <p:sldId id="311" r:id="rId13"/>
+    <p:sldId id="312" r:id="rId14"/>
+    <p:sldId id="313" r:id="rId15"/>
+    <p:sldId id="314" r:id="rId16"/>
+    <p:sldId id="317" r:id="rId17"/>
+    <p:sldId id="318" r:id="rId18"/>
+    <p:sldId id="305" r:id="rId19"/>
   </p:sldIdLst>
   <p:sldSz cx="9144000" cy="6858000" type="screen4x3"/>
   <p:notesSz cx="6858000" cy="9144000"/>
@@ -693,7 +694,7 @@
           <a:p>
             <a:fld id="{E5D4B8C3-E62F-4D90-96E6-3B107CCE0282}" type="slidenum">
               <a:rPr lang="en-US" smtClean="0"/>
-              <a:t>3</a:t>
+              <a:t>4</a:t>
             </a:fld>
             <a:endParaRPr lang="en-US"/>
           </a:p>
@@ -785,7 +786,7 @@
           <a:p>
             <a:fld id="{E5D4B8C3-E62F-4D90-96E6-3B107CCE0282}" type="slidenum">
               <a:rPr lang="en-US" smtClean="0"/>
-              <a:t>10</a:t>
+              <a:t>11</a:t>
             </a:fld>
             <a:endParaRPr lang="en-US"/>
           </a:p>
@@ -877,7 +878,7 @@
           <a:p>
             <a:fld id="{E5D4B8C3-E62F-4D90-96E6-3B107CCE0282}" type="slidenum">
               <a:rPr lang="en-US" smtClean="0"/>
-              <a:t>15</a:t>
+              <a:t>16</a:t>
             </a:fld>
             <a:endParaRPr lang="en-US"/>
           </a:p>
@@ -4593,67 +4594,53 @@
         <p:spPr/>
         <p:txBody>
           <a:bodyPr>
-            <a:normAutofit fontScale="85000" lnSpcReduction="20000"/>
+            <a:normAutofit lnSpcReduction="10000"/>
           </a:bodyPr>
           <a:lstStyle/>
           <a:p>
             <a:r>
               <a:rPr lang="en-US" dirty="0"/>
-              <a:t>What OS and version needs to be installed?</a:t>
-            </a:r>
-          </a:p>
-          <a:p>
-            <a:r>
-              <a:rPr lang="en-US" dirty="0"/>
-              <a:t>What SDKs / JDKs are required?</a:t>
-            </a:r>
-          </a:p>
-          <a:p>
-            <a:r>
-              <a:rPr lang="en-US" dirty="0"/>
-              <a:t>What IDE and version is required?</a:t>
+              <a:t>Contact info and responsibilities for all team members</a:t>
             </a:r>
           </a:p>
           <a:p>
             <a:pPr lvl="1"/>
             <a:r>
               <a:rPr lang="en-US" dirty="0"/>
-              <a:t>How is the IDE configured to conform to project development standards?</a:t>
-            </a:r>
-          </a:p>
-          <a:p>
-            <a:r>
-              <a:rPr lang="en-US" dirty="0"/>
-              <a:t>What database and version is required?</a:t>
-            </a:r>
-          </a:p>
-          <a:p>
-            <a:r>
-              <a:rPr lang="en-US" dirty="0"/>
-              <a:t>Web projects: What browsers and versions are supported?</a:t>
-            </a:r>
-          </a:p>
-          <a:p>
-            <a:r>
-              <a:rPr lang="en-US" dirty="0"/>
-              <a:t>Cloud projects: Vendor, account information</a:t>
-            </a:r>
-          </a:p>
-          <a:p>
-            <a:r>
-              <a:rPr lang="en-US" dirty="0"/>
-              <a:t>Mobile projects: What devices are supported and where do I get them?</a:t>
-            </a:r>
-          </a:p>
-          <a:p>
-            <a:endParaRPr lang="en-US" dirty="0"/>
+              <a:t>Include project owner/sponsor, PMs, Scrum Masters, BAs, Developers, QA, IT support</a:t>
+            </a:r>
+          </a:p>
+          <a:p>
+            <a:pPr lvl="1"/>
+            <a:r>
+              <a:rPr lang="en-US" dirty="0"/>
+              <a:t>Include email, phone numbers, desk locations</a:t>
+            </a:r>
+          </a:p>
+          <a:p>
+            <a:r>
+              <a:rPr lang="en-US" dirty="0"/>
+              <a:t>Links to project requirements</a:t>
+            </a:r>
+          </a:p>
+          <a:p>
+            <a:r>
+              <a:rPr lang="en-US" dirty="0"/>
+              <a:t>Links to architecture and design docs</a:t>
+            </a:r>
+          </a:p>
+          <a:p>
+            <a:r>
+              <a:rPr lang="en-US" dirty="0"/>
+              <a:t>Project management/issue tracking software/tools</a:t>
+            </a:r>
           </a:p>
         </p:txBody>
       </p:sp>
     </p:spTree>
     <p:extLst>
       <p:ext uri="{BB962C8B-B14F-4D97-AF65-F5344CB8AC3E}">
-        <p14:creationId xmlns:p14="http://schemas.microsoft.com/office/powerpoint/2010/main" val="1603982441"/>
+        <p14:creationId xmlns:p14="http://schemas.microsoft.com/office/powerpoint/2010/main" val="1178388904"/>
       </p:ext>
     </p:extLst>
   </p:cSld>
@@ -4717,62 +4704,67 @@
         <p:spPr/>
         <p:txBody>
           <a:bodyPr>
-            <a:normAutofit/>
+            <a:normAutofit fontScale="85000" lnSpcReduction="20000"/>
           </a:bodyPr>
           <a:lstStyle/>
           <a:p>
             <a:r>
               <a:rPr lang="en-US" dirty="0"/>
-              <a:t>What version control system is being used?</a:t>
-            </a:r>
-          </a:p>
-          <a:p>
-            <a:r>
-              <a:rPr lang="en-US" dirty="0"/>
-              <a:t>What build tool software and version is needed?</a:t>
+              <a:t>What OS and version needs to be installed?</a:t>
+            </a:r>
+          </a:p>
+          <a:p>
+            <a:r>
+              <a:rPr lang="en-US" dirty="0"/>
+              <a:t>What SDKs / JDKs are required?</a:t>
+            </a:r>
+          </a:p>
+          <a:p>
+            <a:r>
+              <a:rPr lang="en-US" dirty="0"/>
+              <a:t>What IDE and version is required?</a:t>
             </a:r>
           </a:p>
           <a:p>
             <a:pPr lvl="1"/>
             <a:r>
               <a:rPr lang="en-US" dirty="0"/>
-              <a:t>Ant/</a:t>
-            </a:r>
-            <a:r>
-              <a:rPr lang="en-US" dirty="0" err="1"/>
-              <a:t>NAnt</a:t>
-            </a:r>
-            <a:r>
-              <a:rPr lang="en-US" dirty="0"/>
-              <a:t>, Maven, Gradle, </a:t>
-            </a:r>
-            <a:r>
-              <a:rPr lang="en-US" dirty="0" err="1"/>
-              <a:t>MSBuild</a:t>
-            </a:r>
-            <a:r>
-              <a:rPr lang="en-US" dirty="0"/>
-              <a:t>, Grunt, Gulp, internally developed/proprietary?</a:t>
-            </a:r>
-          </a:p>
-          <a:p>
-            <a:r>
-              <a:rPr lang="en-US" dirty="0"/>
-              <a:t>What dependency management server is used?</a:t>
-            </a:r>
-          </a:p>
-          <a:p>
-            <a:r>
-              <a:rPr lang="en-US" dirty="0"/>
-              <a:t>What continuous integration is being used?</a:t>
-            </a:r>
+              <a:t>How is the IDE configured to conform to project development standards?</a:t>
+            </a:r>
+          </a:p>
+          <a:p>
+            <a:r>
+              <a:rPr lang="en-US" dirty="0"/>
+              <a:t>What database and version is required?</a:t>
+            </a:r>
+          </a:p>
+          <a:p>
+            <a:r>
+              <a:rPr lang="en-US" dirty="0"/>
+              <a:t>Web projects: What browsers and versions are supported?</a:t>
+            </a:r>
+          </a:p>
+          <a:p>
+            <a:r>
+              <a:rPr lang="en-US" dirty="0"/>
+              <a:t>Cloud projects: Vendor, account information</a:t>
+            </a:r>
+          </a:p>
+          <a:p>
+            <a:r>
+              <a:rPr lang="en-US" dirty="0"/>
+              <a:t>Mobile projects: What devices are supported and where do I get them?</a:t>
+            </a:r>
+          </a:p>
+          <a:p>
+            <a:endParaRPr lang="en-US" dirty="0"/>
           </a:p>
         </p:txBody>
       </p:sp>
     </p:spTree>
     <p:extLst>
       <p:ext uri="{BB962C8B-B14F-4D97-AF65-F5344CB8AC3E}">
-        <p14:creationId xmlns:p14="http://schemas.microsoft.com/office/powerpoint/2010/main" val="1258895374"/>
+        <p14:creationId xmlns:p14="http://schemas.microsoft.com/office/powerpoint/2010/main" val="1603982441"/>
       </p:ext>
     </p:extLst>
   </p:cSld>
@@ -4818,7 +4810,7 @@
           <a:p>
             <a:r>
               <a:rPr lang="en-US" dirty="0"/>
-              <a:t>What needs to be covered?	</a:t>
+              <a:t>What needs to be covered?</a:t>
             </a:r>
           </a:p>
         </p:txBody>
@@ -4836,48 +4828,54 @@
         <p:spPr/>
         <p:txBody>
           <a:bodyPr>
-            <a:normAutofit fontScale="92500"/>
+            <a:normAutofit/>
           </a:bodyPr>
           <a:lstStyle/>
           <a:p>
             <a:r>
               <a:rPr lang="en-US" dirty="0"/>
-              <a:t>How is the project pulled from source control, built, tested, installed/deployed and executed?</a:t>
+              <a:t>What version control system is being used?</a:t>
+            </a:r>
+          </a:p>
+          <a:p>
+            <a:r>
+              <a:rPr lang="en-US" dirty="0"/>
+              <a:t>What build tool software and version is needed?</a:t>
             </a:r>
           </a:p>
           <a:p>
             <a:pPr lvl="1"/>
             <a:r>
               <a:rPr lang="en-US" dirty="0"/>
-              <a:t>Provide step by step instructions</a:t>
-            </a:r>
-          </a:p>
-          <a:p>
-            <a:pPr lvl="1"/>
-            <a:r>
-              <a:rPr lang="en-US" dirty="0"/>
-              <a:t>Include database setup instructions</a:t>
-            </a:r>
-          </a:p>
-          <a:p>
-            <a:pPr lvl="1"/>
-            <a:r>
-              <a:rPr lang="en-US" dirty="0">
-                <a:solidFill>
-                  <a:srgbClr val="FF0000"/>
-                </a:solidFill>
-              </a:rPr>
-              <a:t>RED ALERT 🚨</a:t>
-            </a:r>
-            <a:r>
-              <a:rPr lang="en-US" dirty="0"/>
-              <a:t>: If this is not relatively straightforward, there may be something amiss in the project</a:t>
-            </a:r>
-          </a:p>
-          <a:p>
-            <a:r>
-              <a:rPr lang="en-US" dirty="0"/>
-              <a:t>What standards and/or guidelines are followed when developing, testing, and committing changes?</a:t>
+              <a:t>Ant/</a:t>
+            </a:r>
+            <a:r>
+              <a:rPr lang="en-US" dirty="0" err="1"/>
+              <a:t>NAnt</a:t>
+            </a:r>
+            <a:r>
+              <a:rPr lang="en-US" dirty="0"/>
+              <a:t>, Maven, Gradle, </a:t>
+            </a:r>
+            <a:r>
+              <a:rPr lang="en-US" dirty="0" err="1"/>
+              <a:t>MSBuild</a:t>
+            </a:r>
+            <a:r>
+              <a:rPr lang="en-US" dirty="0"/>
+              <a:t>, Grunt, Gulp, internally developed/proprietary?</a:t>
+            </a:r>
+          </a:p>
+          <a:p>
+            <a:r>
+              <a:rPr lang="en-US" dirty="0"/>
+              <a:t>What dependency management server is used?</a:t>
+            </a:r>
+          </a:p>
+          <a:p>
+            <a:r>
+              <a:rPr lang="en-US" dirty="0"/>
+              <a:t>What continuous integration is being used?</a:t>
             </a:r>
           </a:p>
         </p:txBody>
@@ -4885,7 +4883,7 @@
     </p:spTree>
     <p:extLst>
       <p:ext uri="{BB962C8B-B14F-4D97-AF65-F5344CB8AC3E}">
-        <p14:creationId xmlns:p14="http://schemas.microsoft.com/office/powerpoint/2010/main" val="1854567186"/>
+        <p14:creationId xmlns:p14="http://schemas.microsoft.com/office/powerpoint/2010/main" val="1258895374"/>
       </p:ext>
     </p:extLst>
   </p:cSld>
@@ -4931,7 +4929,7 @@
           <a:p>
             <a:r>
               <a:rPr lang="en-US" dirty="0"/>
-              <a:t>What needs to be covered?</a:t>
+              <a:t>What needs to be covered?	</a:t>
             </a:r>
           </a:p>
         </p:txBody>
@@ -4948,39 +4946,49 @@
         </p:nvSpPr>
         <p:spPr/>
         <p:txBody>
-          <a:bodyPr/>
-          <a:lstStyle/>
-          <a:p>
-            <a:r>
-              <a:rPr lang="en-US" dirty="0"/>
-              <a:t>Project directory structure</a:t>
+          <a:bodyPr>
+            <a:normAutofit fontScale="92500"/>
+          </a:bodyPr>
+          <a:lstStyle/>
+          <a:p>
+            <a:r>
+              <a:rPr lang="en-US" dirty="0"/>
+              <a:t>How is the project pulled from source control, built, tested, installed/deployed and executed?</a:t>
             </a:r>
           </a:p>
           <a:p>
             <a:pPr lvl="1"/>
             <a:r>
               <a:rPr lang="en-US" dirty="0"/>
-              <a:t>Describe what can be found and where</a:t>
+              <a:t>Provide step by step instructions</a:t>
             </a:r>
           </a:p>
           <a:p>
             <a:pPr lvl="1"/>
             <a:r>
               <a:rPr lang="en-US" dirty="0"/>
-              <a:t>Very important if the project deviates from commonly followed patterns</a:t>
+              <a:t>Include database setup instructions</a:t>
             </a:r>
           </a:p>
           <a:p>
             <a:pPr lvl="1"/>
             <a:r>
-              <a:rPr lang="en-US" dirty="0"/>
-              <a:t>Very important if structure is "very large"</a:t>
-            </a:r>
-          </a:p>
-          <a:p>
-            <a:r>
-              <a:rPr lang="en-US" dirty="0"/>
-              <a:t>Include a FAQ section that includes answers to commonly asked questions or encountered problems</a:t>
+              <a:rPr lang="en-US" dirty="0">
+                <a:solidFill>
+                  <a:srgbClr val="FF0000"/>
+                </a:solidFill>
+              </a:rPr>
+              <a:t>RED ALERT 🚨</a:t>
+            </a:r>
+            <a:r>
+              <a:rPr lang="en-US" dirty="0"/>
+              <a:t>: If this is not relatively straightforward, there may be something amiss in the project</a:t>
+            </a:r>
+          </a:p>
+          <a:p>
+            <a:r>
+              <a:rPr lang="en-US" dirty="0"/>
+              <a:t>What standards and/or guidelines are followed when developing, testing, and committing changes?</a:t>
             </a:r>
           </a:p>
         </p:txBody>
@@ -4988,7 +4996,7 @@
     </p:spTree>
     <p:extLst>
       <p:ext uri="{BB962C8B-B14F-4D97-AF65-F5344CB8AC3E}">
-        <p14:creationId xmlns:p14="http://schemas.microsoft.com/office/powerpoint/2010/main" val="1645851768"/>
+        <p14:creationId xmlns:p14="http://schemas.microsoft.com/office/powerpoint/2010/main" val="1854567186"/>
       </p:ext>
     </p:extLst>
   </p:cSld>
@@ -5034,7 +5042,7 @@
           <a:p>
             <a:r>
               <a:rPr lang="en-US" dirty="0"/>
-              <a:t>Who writes and maintains this?</a:t>
+              <a:t>What needs to be covered?</a:t>
             </a:r>
           </a:p>
         </p:txBody>
@@ -5056,45 +5064,34 @@
           <a:p>
             <a:r>
               <a:rPr lang="en-US" dirty="0"/>
-              <a:t>Project architect writes initial version</a:t>
+              <a:t>Project directory structure</a:t>
             </a:r>
           </a:p>
           <a:p>
             <a:pPr lvl="1"/>
             <a:r>
               <a:rPr lang="en-US" dirty="0"/>
-              <a:t>Will enlist help from others to write it</a:t>
-            </a:r>
-          </a:p>
-          <a:p>
-            <a:r>
-              <a:rPr lang="en-US" dirty="0"/>
-              <a:t>Entire development team owns it</a:t>
+              <a:t>Describe what can be found and where</a:t>
             </a:r>
           </a:p>
           <a:p>
             <a:pPr lvl="1"/>
             <a:r>
               <a:rPr lang="en-US" dirty="0"/>
-              <a:t>Recurring task in each sprint to update it</a:t>
-            </a:r>
-          </a:p>
-          <a:p>
-            <a:r>
-              <a:rPr lang="en-US" b="1" u="sng" dirty="0"/>
-              <a:t>Do not put this off until later!!</a:t>
-            </a:r>
-          </a:p>
-          <a:p>
-            <a:r>
-              <a:rPr lang="en-US" b="1" u="sng" dirty="0"/>
-              <a:t>Do not ignore it once it's written!!</a:t>
-            </a:r>
-          </a:p>
-          <a:p>
-            <a:r>
-              <a:rPr lang="en-US" dirty="0"/>
-              <a:t>TEST IT!</a:t>
+              <a:t>Very important if the project deviates from commonly followed patterns</a:t>
+            </a:r>
+          </a:p>
+          <a:p>
+            <a:pPr lvl="1"/>
+            <a:r>
+              <a:rPr lang="en-US" dirty="0"/>
+              <a:t>Very important if structure is "very large"</a:t>
+            </a:r>
+          </a:p>
+          <a:p>
+            <a:r>
+              <a:rPr lang="en-US" dirty="0"/>
+              <a:t>Include a FAQ section that includes answers to commonly asked questions or encountered problems</a:t>
             </a:r>
           </a:p>
         </p:txBody>
@@ -5102,7 +5099,7 @@
     </p:spTree>
     <p:extLst>
       <p:ext uri="{BB962C8B-B14F-4D97-AF65-F5344CB8AC3E}">
-        <p14:creationId xmlns:p14="http://schemas.microsoft.com/office/powerpoint/2010/main" val="1823573400"/>
+        <p14:creationId xmlns:p14="http://schemas.microsoft.com/office/powerpoint/2010/main" val="1645851768"/>
       </p:ext>
     </p:extLst>
   </p:cSld>
@@ -5148,7 +5145,7 @@
           <a:p>
             <a:r>
               <a:rPr lang="en-US" dirty="0"/>
-              <a:t>How do you write it?</a:t>
+              <a:t>Who writes and maintains this?</a:t>
             </a:r>
           </a:p>
         </p:txBody>
@@ -5170,64 +5167,45 @@
           <a:p>
             <a:r>
               <a:rPr lang="en-US" dirty="0"/>
-              <a:t>Keep it simple and straightforward</a:t>
-            </a:r>
-          </a:p>
-          <a:p>
-            <a:r>
-              <a:rPr lang="en-US" dirty="0"/>
-              <a:t>Know and target your audience</a:t>
-            </a:r>
-          </a:p>
-          <a:p>
-            <a:r>
-              <a:rPr lang="en-US" dirty="0"/>
-              <a:t>Treat it as a project deliverable</a:t>
+              <a:t>Project architect writes initial version</a:t>
             </a:r>
           </a:p>
           <a:p>
             <a:pPr lvl="1"/>
             <a:r>
               <a:rPr lang="en-US" dirty="0"/>
-              <a:t>Version controlled</a:t>
-            </a:r>
-          </a:p>
-          <a:p>
-            <a:r>
-              <a:rPr lang="en-US" dirty="0"/>
-              <a:t>DRY </a:t>
-            </a:r>
-            <a:r>
-              <a:rPr lang="mr-IN" dirty="0"/>
-              <a:t>–</a:t>
-            </a:r>
-            <a:r>
-              <a:rPr lang="en-US" dirty="0"/>
-              <a:t> Don't repeat yourself</a:t>
-            </a:r>
-          </a:p>
-          <a:p>
-            <a:r>
-              <a:rPr lang="en-US" dirty="0"/>
-              <a:t>Suggested tools</a:t>
+              <a:t>Will enlist help from others to write it</a:t>
+            </a:r>
+          </a:p>
+          <a:p>
+            <a:r>
+              <a:rPr lang="en-US" dirty="0"/>
+              <a:t>Entire development team owns it</a:t>
             </a:r>
           </a:p>
           <a:p>
             <a:pPr lvl="1"/>
             <a:r>
               <a:rPr lang="en-US" dirty="0"/>
-              <a:t>Microsoft Office</a:t>
-            </a:r>
-          </a:p>
-          <a:p>
-            <a:pPr lvl="1"/>
-            <a:r>
-              <a:rPr lang="en-US" dirty="0" err="1"/>
-              <a:t>Atlassian</a:t>
-            </a:r>
-            <a:r>
-              <a:rPr lang="en-US" dirty="0"/>
-              <a:t> Confluence</a:t>
+              <a:t>Recurring task in each sprint to update it</a:t>
+            </a:r>
+          </a:p>
+          <a:p>
+            <a:r>
+              <a:rPr lang="en-US" b="1" u="sng" dirty="0"/>
+              <a:t>Do not put this off until later!!</a:t>
+            </a:r>
+          </a:p>
+          <a:p>
+            <a:r>
+              <a:rPr lang="en-US" b="1" u="sng" dirty="0"/>
+              <a:t>Do not ignore it once it's written!!</a:t>
+            </a:r>
+          </a:p>
+          <a:p>
+            <a:r>
+              <a:rPr lang="en-US" dirty="0"/>
+              <a:t>TEST IT!</a:t>
             </a:r>
           </a:p>
         </p:txBody>
@@ -5235,7 +5213,7 @@
     </p:spTree>
     <p:extLst>
       <p:ext uri="{BB962C8B-B14F-4D97-AF65-F5344CB8AC3E}">
-        <p14:creationId xmlns:p14="http://schemas.microsoft.com/office/powerpoint/2010/main" val="1453716295"/>
+        <p14:creationId xmlns:p14="http://schemas.microsoft.com/office/powerpoint/2010/main" val="1823573400"/>
       </p:ext>
     </p:extLst>
   </p:cSld>
@@ -5281,7 +5259,7 @@
           <a:p>
             <a:r>
               <a:rPr lang="en-US" dirty="0"/>
-              <a:t>Examples</a:t>
+              <a:t>How do you write it?</a:t>
             </a:r>
           </a:p>
         </p:txBody>
@@ -5303,7 +5281,64 @@
           <a:p>
             <a:r>
               <a:rPr lang="en-US" dirty="0"/>
-              <a:t>Let's walkthrough some sample documentation</a:t>
+              <a:t>Keep it simple and straightforward</a:t>
+            </a:r>
+          </a:p>
+          <a:p>
+            <a:r>
+              <a:rPr lang="en-US" dirty="0"/>
+              <a:t>Know and target your audience</a:t>
+            </a:r>
+          </a:p>
+          <a:p>
+            <a:r>
+              <a:rPr lang="en-US" dirty="0"/>
+              <a:t>Treat it as a project deliverable</a:t>
+            </a:r>
+          </a:p>
+          <a:p>
+            <a:pPr lvl="1"/>
+            <a:r>
+              <a:rPr lang="en-US" dirty="0"/>
+              <a:t>Version controlled</a:t>
+            </a:r>
+          </a:p>
+          <a:p>
+            <a:r>
+              <a:rPr lang="en-US" dirty="0"/>
+              <a:t>DRY </a:t>
+            </a:r>
+            <a:r>
+              <a:rPr lang="mr-IN" dirty="0"/>
+              <a:t>–</a:t>
+            </a:r>
+            <a:r>
+              <a:rPr lang="en-US" dirty="0"/>
+              <a:t> Don't repeat yourself</a:t>
+            </a:r>
+          </a:p>
+          <a:p>
+            <a:r>
+              <a:rPr lang="en-US" dirty="0"/>
+              <a:t>Suggested tools</a:t>
+            </a:r>
+          </a:p>
+          <a:p>
+            <a:pPr lvl="1"/>
+            <a:r>
+              <a:rPr lang="en-US" dirty="0"/>
+              <a:t>Microsoft Office</a:t>
+            </a:r>
+          </a:p>
+          <a:p>
+            <a:pPr lvl="1"/>
+            <a:r>
+              <a:rPr lang="en-US" dirty="0" err="1"/>
+              <a:t>Atlassian</a:t>
+            </a:r>
+            <a:r>
+              <a:rPr lang="en-US" dirty="0"/>
+              <a:t> Confluence</a:t>
             </a:r>
           </a:p>
         </p:txBody>
@@ -5311,7 +5346,7 @@
     </p:spTree>
     <p:extLst>
       <p:ext uri="{BB962C8B-B14F-4D97-AF65-F5344CB8AC3E}">
-        <p14:creationId xmlns:p14="http://schemas.microsoft.com/office/powerpoint/2010/main" val="453956232"/>
+        <p14:creationId xmlns:p14="http://schemas.microsoft.com/office/powerpoint/2010/main" val="1453716295"/>
       </p:ext>
     </p:extLst>
   </p:cSld>
@@ -5357,6 +5392,82 @@
           <a:p>
             <a:r>
               <a:rPr lang="en-US" dirty="0"/>
+              <a:t>Examples</a:t>
+            </a:r>
+          </a:p>
+        </p:txBody>
+      </p:sp>
+      <p:sp>
+        <p:nvSpPr>
+          <p:cNvPr id="3" name="Content Placeholder 2"/>
+          <p:cNvSpPr>
+            <a:spLocks noGrp="1"/>
+          </p:cNvSpPr>
+          <p:nvPr>
+            <p:ph idx="1"/>
+          </p:nvPr>
+        </p:nvSpPr>
+        <p:spPr/>
+        <p:txBody>
+          <a:bodyPr/>
+          <a:lstStyle/>
+          <a:p>
+            <a:r>
+              <a:rPr lang="en-US" dirty="0"/>
+              <a:t>Let's walkthrough some sample documentation</a:t>
+            </a:r>
+          </a:p>
+        </p:txBody>
+      </p:sp>
+    </p:spTree>
+    <p:extLst>
+      <p:ext uri="{BB962C8B-B14F-4D97-AF65-F5344CB8AC3E}">
+        <p14:creationId xmlns:p14="http://schemas.microsoft.com/office/powerpoint/2010/main" val="453956232"/>
+      </p:ext>
+    </p:extLst>
+  </p:cSld>
+  <p:clrMapOvr>
+    <a:masterClrMapping/>
+  </p:clrMapOvr>
+</p:sld>
+</file>
+
+<file path=ppt/slides/slide18.xml><?xml version="1.0" encoding="utf-8"?>
+<p:sld xmlns:a="http://schemas.openxmlformats.org/drawingml/2006/main" xmlns:r="http://schemas.openxmlformats.org/officeDocument/2006/relationships" xmlns:p="http://schemas.openxmlformats.org/presentationml/2006/main">
+  <p:cSld>
+    <p:spTree>
+      <p:nvGrpSpPr>
+        <p:cNvPr id="1" name=""/>
+        <p:cNvGrpSpPr/>
+        <p:nvPr/>
+      </p:nvGrpSpPr>
+      <p:grpSpPr>
+        <a:xfrm>
+          <a:off x="0" y="0"/>
+          <a:ext cx="0" cy="0"/>
+          <a:chOff x="0" y="0"/>
+          <a:chExt cx="0" cy="0"/>
+        </a:xfrm>
+      </p:grpSpPr>
+      <p:sp>
+        <p:nvSpPr>
+          <p:cNvPr id="2" name="Title 1"/>
+          <p:cNvSpPr>
+            <a:spLocks noGrp="1"/>
+          </p:cNvSpPr>
+          <p:nvPr>
+            <p:ph type="title"/>
+          </p:nvPr>
+        </p:nvSpPr>
+        <p:spPr/>
+        <p:txBody>
+          <a:bodyPr>
+            <a:normAutofit fontScale="90000"/>
+          </a:bodyPr>
+          <a:lstStyle/>
+          <a:p>
+            <a:r>
+              <a:rPr lang="en-US" dirty="0"/>
               <a:t>Questions</a:t>
             </a:r>
           </a:p>
@@ -5449,16 +5560,22 @@
               <a:rPr lang="en-US" dirty="0"/>
             </a:br>
             <a:r>
-              <a:rPr lang="en-US" dirty="0"/>
+              <a:rPr lang="en-US" dirty="0">
+                <a:hlinkClick r:id="rId5"/>
+              </a:rPr>
               <a:t>https://</a:t>
             </a:r>
             <a:r>
-              <a:rPr lang="en-US" dirty="0" err="1"/>
+              <a:rPr lang="en-US" dirty="0" err="1">
+                <a:hlinkClick r:id="rId5"/>
+              </a:rPr>
               <a:t>goo.gl</a:t>
             </a:r>
             <a:r>
-              <a:rPr lang="en-US"/>
-              <a:t>/N3fv7f</a:t>
+              <a:rPr lang="en-US" dirty="0">
+                <a:hlinkClick r:id="rId5"/>
+              </a:rPr>
+              <a:t>/H4wvrg</a:t>
             </a:r>
             <a:endParaRPr lang="en-US" dirty="0"/>
           </a:p>
@@ -5628,7 +5745,13 @@
       </p:grpSpPr>
       <p:sp>
         <p:nvSpPr>
-          <p:cNvPr id="2" name="Title 1"/>
+          <p:cNvPr id="2" name="Title 1">
+            <a:extLst>
+              <a:ext uri="{FF2B5EF4-FFF2-40B4-BE49-F238E27FC236}">
+                <a16:creationId xmlns:a16="http://schemas.microsoft.com/office/drawing/2014/main" id="{09582F26-A757-624D-8961-35EA1E30F7E7}"/>
+              </a:ext>
+            </a:extLst>
+          </p:cNvPr>
           <p:cNvSpPr>
             <a:spLocks noGrp="1"/>
           </p:cNvSpPr>
@@ -5645,14 +5768,20 @@
           <a:p>
             <a:r>
               <a:rPr lang="en-US" dirty="0"/>
-              <a:t>Introduction</a:t>
-            </a:r>
-          </a:p>
-        </p:txBody>
-      </p:sp>
-      <p:sp>
-        <p:nvSpPr>
-          <p:cNvPr id="3" name="Content Placeholder 2"/>
+              <a:t>Dude?!?!</a:t>
+            </a:r>
+          </a:p>
+        </p:txBody>
+      </p:sp>
+      <p:sp>
+        <p:nvSpPr>
+          <p:cNvPr id="3" name="Content Placeholder 2">
+            <a:extLst>
+              <a:ext uri="{FF2B5EF4-FFF2-40B4-BE49-F238E27FC236}">
+                <a16:creationId xmlns:a16="http://schemas.microsoft.com/office/drawing/2014/main" id="{A28DBFEC-0883-E14C-B3AA-CB3FE4EE5868}"/>
+              </a:ext>
+            </a:extLst>
+          </p:cNvPr>
           <p:cNvSpPr>
             <a:spLocks noGrp="1"/>
           </p:cNvSpPr>
@@ -5663,52 +5792,60 @@
         <p:spPr/>
         <p:txBody>
           <a:bodyPr>
-            <a:normAutofit fontScale="85000" lnSpcReduction="10000"/>
+            <a:normAutofit/>
           </a:bodyPr>
           <a:lstStyle/>
           <a:p>
-            <a:r>
-              <a:rPr lang="en-US" dirty="0"/>
-              <a:t>28+ year career</a:t>
-            </a:r>
-          </a:p>
-          <a:p>
-            <a:r>
-              <a:rPr lang="en-US" dirty="0"/>
-              <a:t>Several development projects for multiple companies</a:t>
-            </a:r>
-          </a:p>
-          <a:p>
-            <a:pPr lvl="1"/>
-            <a:r>
-              <a:rPr lang="en-US" dirty="0"/>
-              <a:t>IBM, Lexmark, Diebold, Limited Brands, Sterling Commerce, IBM (again), Leading EDJE, Crown Equipment Corp, Wendy's, Improving, Ohio State, Abercrombie &amp; Fitch</a:t>
-            </a:r>
-          </a:p>
-          <a:p>
-            <a:r>
-              <a:rPr lang="en-US" dirty="0"/>
-              <a:t>Worked on several projects with effective documentation 😃</a:t>
-            </a:r>
-          </a:p>
-          <a:p>
-            <a:r>
-              <a:rPr lang="en-US" dirty="0"/>
-              <a:t>Worked on several projects where there was little to no documentation (and wrote docs for them)😢</a:t>
-            </a:r>
-          </a:p>
-          <a:p>
-            <a:r>
-              <a:rPr lang="en-US" dirty="0"/>
-              <a:t>Who are you?</a:t>
-            </a:r>
-          </a:p>
-        </p:txBody>
-      </p:sp>
+            <a:pPr marL="0" indent="0">
+              <a:buNone/>
+            </a:pPr>
+            <a:r>
+              <a:rPr lang="en-US" sz="4000" dirty="0"/>
+              <a:t> </a:t>
+            </a:r>
+          </a:p>
+        </p:txBody>
+      </p:sp>
+      <p:pic>
+        <p:nvPicPr>
+          <p:cNvPr id="5" name="Picture 4">
+            <a:extLst>
+              <a:ext uri="{FF2B5EF4-FFF2-40B4-BE49-F238E27FC236}">
+                <a16:creationId xmlns:a16="http://schemas.microsoft.com/office/drawing/2014/main" id="{4B57728B-A314-3247-8573-E9507DAE141E}"/>
+              </a:ext>
+            </a:extLst>
+          </p:cNvPr>
+          <p:cNvPicPr>
+            <a:picLocks noChangeAspect="1"/>
+          </p:cNvPicPr>
+          <p:nvPr/>
+        </p:nvPicPr>
+        <p:blipFill>
+          <a:blip r:embed="rId2">
+            <a:extLst>
+              <a:ext uri="{28A0092B-C50C-407E-A947-70E740481C1C}">
+                <a14:useLocalDpi xmlns:a14="http://schemas.microsoft.com/office/drawing/2010/main" val="0"/>
+              </a:ext>
+            </a:extLst>
+          </a:blip>
+          <a:stretch>
+            <a:fillRect/>
+          </a:stretch>
+        </p:blipFill>
+        <p:spPr>
+          <a:xfrm>
+            <a:off x="2309018" y="1143000"/>
+            <a:ext cx="4525963" cy="4525963"/>
+          </a:xfrm>
+          <a:prstGeom prst="rect">
+            <a:avLst/>
+          </a:prstGeom>
+        </p:spPr>
+      </p:pic>
     </p:spTree>
     <p:extLst>
       <p:ext uri="{BB962C8B-B14F-4D97-AF65-F5344CB8AC3E}">
-        <p14:creationId xmlns:p14="http://schemas.microsoft.com/office/powerpoint/2010/main" val="836982972"/>
+        <p14:creationId xmlns:p14="http://schemas.microsoft.com/office/powerpoint/2010/main" val="3311894362"/>
       </p:ext>
     </p:extLst>
   </p:cSld>
@@ -5753,8 +5890,8 @@
           <a:lstStyle/>
           <a:p>
             <a:r>
-              <a:rPr lang="en-US"/>
-              <a:t>About Improving</a:t>
+              <a:rPr lang="en-US" dirty="0"/>
+              <a:t>Introduction</a:t>
             </a:r>
           </a:p>
         </p:txBody>
@@ -5772,66 +5909,52 @@
         <p:spPr/>
         <p:txBody>
           <a:bodyPr>
-            <a:normAutofit fontScale="92500" lnSpcReduction="20000"/>
+            <a:normAutofit fontScale="85000" lnSpcReduction="10000"/>
           </a:bodyPr>
           <a:lstStyle/>
           <a:p>
-            <a:pPr marL="0" indent="0">
-              <a:buNone/>
-            </a:pPr>
-            <a:r>
-              <a:rPr lang="en-US" sz="4300"/>
-              <a:t>Creating a great place to work by</a:t>
-            </a:r>
-            <a:r>
-              <a:rPr lang="en-US"/>
-              <a:t> </a:t>
-            </a:r>
-          </a:p>
-          <a:p>
-            <a:pPr fontAlgn="auto"/>
-            <a:r>
-              <a:rPr lang="en-US"/>
-              <a:t>Cultivating an environment that fosters authentic and long term professional relationships </a:t>
-            </a:r>
-          </a:p>
-          <a:p>
-            <a:pPr fontAlgn="auto"/>
-            <a:r>
-              <a:rPr lang="en-US"/>
-              <a:t>Sharing the success and accomplishments of the company </a:t>
-            </a:r>
-          </a:p>
-          <a:p>
-            <a:pPr fontAlgn="auto"/>
-            <a:r>
-              <a:rPr lang="en-US"/>
-              <a:t>Promoting open and honest communication </a:t>
-            </a:r>
-          </a:p>
-          <a:p>
-            <a:pPr fontAlgn="auto"/>
-            <a:r>
-              <a:rPr lang="en-US"/>
-              <a:t>Providing creative ways for each of us to learn and grow </a:t>
-            </a:r>
-          </a:p>
-          <a:p>
-            <a:pPr fontAlgn="auto"/>
-            <a:r>
-              <a:rPr lang="en-US"/>
-              <a:t>Encouraging a positive atmosphere which is both friendly and fun </a:t>
-            </a:r>
-          </a:p>
-          <a:p>
-            <a:endParaRPr lang="en-US"/>
+            <a:r>
+              <a:rPr lang="en-US" dirty="0"/>
+              <a:t>28+ year career (I'm getting old)</a:t>
+            </a:r>
+          </a:p>
+          <a:p>
+            <a:r>
+              <a:rPr lang="en-US" dirty="0"/>
+              <a:t>Several development projects for multiple companies</a:t>
+            </a:r>
+          </a:p>
+          <a:p>
+            <a:pPr lvl="1"/>
+            <a:r>
+              <a:rPr lang="en-US" dirty="0"/>
+              <a:t>IBM, Lexmark, Diebold, Limited Brands, Sterling Commerce, IBM (again), Leading EDJE, Crown Equipment Corp, Wendy's, Improving, Ohio State, Abercrombie &amp; Fitch</a:t>
+            </a:r>
+          </a:p>
+          <a:p>
+            <a:r>
+              <a:rPr lang="en-US" dirty="0"/>
+              <a:t>Worked on several projects with effective documentation 😃</a:t>
+            </a:r>
+          </a:p>
+          <a:p>
+            <a:r>
+              <a:rPr lang="en-US" dirty="0"/>
+              <a:t>Worked on several projects where there was little to no documentation (and wrote docs for them)😢</a:t>
+            </a:r>
+          </a:p>
+          <a:p>
+            <a:r>
+              <a:rPr lang="en-US" dirty="0"/>
+              <a:t>Who are you?</a:t>
+            </a:r>
           </a:p>
         </p:txBody>
       </p:sp>
     </p:spTree>
     <p:extLst>
       <p:ext uri="{BB962C8B-B14F-4D97-AF65-F5344CB8AC3E}">
-        <p14:creationId xmlns:p14="http://schemas.microsoft.com/office/powerpoint/2010/main" val="1411089625"/>
+        <p14:creationId xmlns:p14="http://schemas.microsoft.com/office/powerpoint/2010/main" val="836982972"/>
       </p:ext>
     </p:extLst>
   </p:cSld>
@@ -5876,6 +5999,129 @@
           <a:lstStyle/>
           <a:p>
             <a:r>
+              <a:rPr lang="en-US"/>
+              <a:t>About Improving</a:t>
+            </a:r>
+          </a:p>
+        </p:txBody>
+      </p:sp>
+      <p:sp>
+        <p:nvSpPr>
+          <p:cNvPr id="3" name="Content Placeholder 2"/>
+          <p:cNvSpPr>
+            <a:spLocks noGrp="1"/>
+          </p:cNvSpPr>
+          <p:nvPr>
+            <p:ph idx="1"/>
+          </p:nvPr>
+        </p:nvSpPr>
+        <p:spPr/>
+        <p:txBody>
+          <a:bodyPr>
+            <a:normAutofit fontScale="92500" lnSpcReduction="20000"/>
+          </a:bodyPr>
+          <a:lstStyle/>
+          <a:p>
+            <a:pPr marL="0" indent="0">
+              <a:buNone/>
+            </a:pPr>
+            <a:r>
+              <a:rPr lang="en-US" sz="4300"/>
+              <a:t>Creating a great place to work by</a:t>
+            </a:r>
+            <a:r>
+              <a:rPr lang="en-US"/>
+              <a:t> </a:t>
+            </a:r>
+          </a:p>
+          <a:p>
+            <a:pPr fontAlgn="auto"/>
+            <a:r>
+              <a:rPr lang="en-US"/>
+              <a:t>Cultivating an environment that fosters authentic and long term professional relationships </a:t>
+            </a:r>
+          </a:p>
+          <a:p>
+            <a:pPr fontAlgn="auto"/>
+            <a:r>
+              <a:rPr lang="en-US"/>
+              <a:t>Sharing the success and accomplishments of the company </a:t>
+            </a:r>
+          </a:p>
+          <a:p>
+            <a:pPr fontAlgn="auto"/>
+            <a:r>
+              <a:rPr lang="en-US"/>
+              <a:t>Promoting open and honest communication </a:t>
+            </a:r>
+          </a:p>
+          <a:p>
+            <a:pPr fontAlgn="auto"/>
+            <a:r>
+              <a:rPr lang="en-US"/>
+              <a:t>Providing creative ways for each of us to learn and grow </a:t>
+            </a:r>
+          </a:p>
+          <a:p>
+            <a:pPr fontAlgn="auto"/>
+            <a:r>
+              <a:rPr lang="en-US"/>
+              <a:t>Encouraging a positive atmosphere which is both friendly and fun </a:t>
+            </a:r>
+          </a:p>
+          <a:p>
+            <a:endParaRPr lang="en-US"/>
+          </a:p>
+        </p:txBody>
+      </p:sp>
+    </p:spTree>
+    <p:extLst>
+      <p:ext uri="{BB962C8B-B14F-4D97-AF65-F5344CB8AC3E}">
+        <p14:creationId xmlns:p14="http://schemas.microsoft.com/office/powerpoint/2010/main" val="1411089625"/>
+      </p:ext>
+    </p:extLst>
+  </p:cSld>
+  <p:clrMapOvr>
+    <a:masterClrMapping/>
+  </p:clrMapOvr>
+</p:sld>
+</file>
+
+<file path=ppt/slides/slide6.xml><?xml version="1.0" encoding="utf-8"?>
+<p:sld xmlns:a="http://schemas.openxmlformats.org/drawingml/2006/main" xmlns:r="http://schemas.openxmlformats.org/officeDocument/2006/relationships" xmlns:p="http://schemas.openxmlformats.org/presentationml/2006/main">
+  <p:cSld>
+    <p:spTree>
+      <p:nvGrpSpPr>
+        <p:cNvPr id="1" name=""/>
+        <p:cNvGrpSpPr/>
+        <p:nvPr/>
+      </p:nvGrpSpPr>
+      <p:grpSpPr>
+        <a:xfrm>
+          <a:off x="0" y="0"/>
+          <a:ext cx="0" cy="0"/>
+          <a:chOff x="0" y="0"/>
+          <a:chExt cx="0" cy="0"/>
+        </a:xfrm>
+      </p:grpSpPr>
+      <p:sp>
+        <p:nvSpPr>
+          <p:cNvPr id="2" name="Title 1"/>
+          <p:cNvSpPr>
+            <a:spLocks noGrp="1"/>
+          </p:cNvSpPr>
+          <p:nvPr>
+            <p:ph type="title"/>
+          </p:nvPr>
+        </p:nvSpPr>
+        <p:spPr/>
+        <p:txBody>
+          <a:bodyPr>
+            <a:normAutofit fontScale="90000"/>
+          </a:bodyPr>
+          <a:lstStyle/>
+          <a:p>
+            <a:r>
               <a:rPr lang="en-US" dirty="0"/>
               <a:t>Why do we need this?</a:t>
             </a:r>
@@ -5966,7 +6212,7 @@
 </p:sld>
 </file>
 
-<file path=ppt/slides/slide6.xml><?xml version="1.0" encoding="utf-8"?>
+<file path=ppt/slides/slide7.xml><?xml version="1.0" encoding="utf-8"?>
 <p:sld xmlns:a="http://schemas.openxmlformats.org/drawingml/2006/main" xmlns:r="http://schemas.openxmlformats.org/officeDocument/2006/relationships" xmlns:p="http://schemas.openxmlformats.org/presentationml/2006/main">
   <p:cSld>
     <p:spTree>
@@ -6106,117 +6352,6 @@
 </p:sld>
 </file>
 
-<file path=ppt/slides/slide7.xml><?xml version="1.0" encoding="utf-8"?>
-<p:sld xmlns:a="http://schemas.openxmlformats.org/drawingml/2006/main" xmlns:r="http://schemas.openxmlformats.org/officeDocument/2006/relationships" xmlns:p="http://schemas.openxmlformats.org/presentationml/2006/main">
-  <p:cSld>
-    <p:spTree>
-      <p:nvGrpSpPr>
-        <p:cNvPr id="1" name=""/>
-        <p:cNvGrpSpPr/>
-        <p:nvPr/>
-      </p:nvGrpSpPr>
-      <p:grpSpPr>
-        <a:xfrm>
-          <a:off x="0" y="0"/>
-          <a:ext cx="0" cy="0"/>
-          <a:chOff x="0" y="0"/>
-          <a:chExt cx="0" cy="0"/>
-        </a:xfrm>
-      </p:grpSpPr>
-      <p:sp>
-        <p:nvSpPr>
-          <p:cNvPr id="2" name="Title 1"/>
-          <p:cNvSpPr>
-            <a:spLocks noGrp="1"/>
-          </p:cNvSpPr>
-          <p:nvPr>
-            <p:ph type="title"/>
-          </p:nvPr>
-        </p:nvSpPr>
-        <p:spPr/>
-        <p:txBody>
-          <a:bodyPr>
-            <a:normAutofit fontScale="90000"/>
-          </a:bodyPr>
-          <a:lstStyle/>
-          <a:p>
-            <a:r>
-              <a:rPr lang="en-US" dirty="0"/>
-              <a:t>Goals</a:t>
-            </a:r>
-          </a:p>
-        </p:txBody>
-      </p:sp>
-      <p:sp>
-        <p:nvSpPr>
-          <p:cNvPr id="3" name="Content Placeholder 2"/>
-          <p:cNvSpPr>
-            <a:spLocks noGrp="1"/>
-          </p:cNvSpPr>
-          <p:nvPr>
-            <p:ph idx="1"/>
-          </p:nvPr>
-        </p:nvSpPr>
-        <p:spPr/>
-        <p:txBody>
-          <a:bodyPr>
-            <a:normAutofit fontScale="92500" lnSpcReduction="10000"/>
-          </a:bodyPr>
-          <a:lstStyle/>
-          <a:p>
-            <a:r>
-              <a:rPr lang="en-US" dirty="0"/>
-              <a:t>Get new teams members up to speed quickly</a:t>
-            </a:r>
-          </a:p>
-          <a:p>
-            <a:r>
-              <a:rPr lang="en-US" dirty="0"/>
-              <a:t>Keep current team members up to date with project changes</a:t>
-            </a:r>
-          </a:p>
-          <a:p>
-            <a:r>
-              <a:rPr lang="en-US" dirty="0"/>
-              <a:t>Project release cadence</a:t>
-            </a:r>
-          </a:p>
-          <a:p>
-            <a:r>
-              <a:rPr lang="en-US" dirty="0"/>
-              <a:t>Project review and verification</a:t>
-            </a:r>
-          </a:p>
-          <a:p>
-            <a:r>
-              <a:rPr lang="en-US" dirty="0"/>
-              <a:t>Transition ongoing development and support to the client or to your support organization</a:t>
-            </a:r>
-          </a:p>
-          <a:p>
-            <a:r>
-              <a:rPr lang="en-US" b="1" u="sng" dirty="0"/>
-              <a:t>Documentation is part of your software deliverable</a:t>
-            </a:r>
-          </a:p>
-          <a:p>
-            <a:endParaRPr lang="en-US" dirty="0"/>
-          </a:p>
-        </p:txBody>
-      </p:sp>
-    </p:spTree>
-    <p:extLst>
-      <p:ext uri="{BB962C8B-B14F-4D97-AF65-F5344CB8AC3E}">
-        <p14:creationId xmlns:p14="http://schemas.microsoft.com/office/powerpoint/2010/main" val="1019005265"/>
-      </p:ext>
-    </p:extLst>
-  </p:cSld>
-  <p:clrMapOvr>
-    <a:masterClrMapping/>
-  </p:clrMapOvr>
-</p:sld>
-</file>
-
 <file path=ppt/slides/slide8.xml><?xml version="1.0" encoding="utf-8"?>
 <p:sld xmlns:a="http://schemas.openxmlformats.org/drawingml/2006/main" xmlns:r="http://schemas.openxmlformats.org/officeDocument/2006/relationships" xmlns:p="http://schemas.openxmlformats.org/presentationml/2006/main">
   <p:cSld>
@@ -6253,7 +6388,7 @@
           <a:p>
             <a:r>
               <a:rPr lang="en-US" dirty="0"/>
-              <a:t>Guidelines</a:t>
+              <a:t>Goals</a:t>
             </a:r>
           </a:p>
         </p:txBody>
@@ -6271,127 +6406,43 @@
         <p:spPr/>
         <p:txBody>
           <a:bodyPr>
-            <a:normAutofit fontScale="77500" lnSpcReduction="20000"/>
+            <a:normAutofit fontScale="92500" lnSpcReduction="10000"/>
           </a:bodyPr>
           <a:lstStyle/>
           <a:p>
             <a:r>
               <a:rPr lang="en-US" dirty="0"/>
-              <a:t>Be specific and limit options</a:t>
-            </a:r>
-          </a:p>
-          <a:p>
-            <a:pPr lvl="1"/>
-            <a:r>
-              <a:rPr lang="en-US" dirty="0"/>
-              <a:t>Ambiguity is </a:t>
-            </a:r>
-            <a:r>
-              <a:rPr lang="en-US" b="1" u="sng" dirty="0">
-                <a:solidFill>
-                  <a:srgbClr val="FF0000"/>
-                </a:solidFill>
-              </a:rPr>
-              <a:t>BAD</a:t>
-            </a:r>
-            <a:r>
-              <a:rPr lang="en-US" dirty="0">
-                <a:solidFill>
-                  <a:srgbClr val="FF0000"/>
-                </a:solidFill>
-              </a:rPr>
-              <a:t> 🤔</a:t>
-            </a:r>
-          </a:p>
-          <a:p>
-            <a:pPr lvl="1"/>
-            <a:r>
-              <a:rPr lang="en-US" dirty="0"/>
-              <a:t>Multiple options </a:t>
-            </a:r>
-            <a:r>
-              <a:rPr lang="en-US" b="1" u="sng" dirty="0">
-                <a:solidFill>
-                  <a:srgbClr val="FF0000"/>
-                </a:solidFill>
-              </a:rPr>
-              <a:t>can be worse</a:t>
-            </a:r>
-            <a:r>
-              <a:rPr lang="en-US" b="1" dirty="0">
-                <a:solidFill>
-                  <a:srgbClr val="FF0000"/>
-                </a:solidFill>
-              </a:rPr>
-              <a:t> </a:t>
-            </a:r>
-            <a:r>
-              <a:rPr lang="en-US" dirty="0"/>
-              <a:t>😳</a:t>
-            </a:r>
-            <a:endParaRPr lang="en-US" b="1" u="sng" dirty="0">
-              <a:solidFill>
-                <a:srgbClr val="FF0000"/>
-              </a:solidFill>
-            </a:endParaRPr>
-          </a:p>
-          <a:p>
-            <a:pPr lvl="1"/>
-            <a:r>
-              <a:rPr lang="en-US" dirty="0"/>
-              <a:t>Helps eliminate "it works on my machine" ☹️</a:t>
-            </a:r>
-          </a:p>
-          <a:p>
-            <a:r>
-              <a:rPr lang="en-US" dirty="0"/>
-              <a:t>Provide </a:t>
-            </a:r>
+              <a:t>Get new teams members up to speed quickly</a:t>
+            </a:r>
+          </a:p>
+          <a:p>
+            <a:r>
+              <a:rPr lang="en-US" dirty="0"/>
+              <a:t>Keep current team members up to date with project changes</a:t>
+            </a:r>
+          </a:p>
+          <a:p>
+            <a:r>
+              <a:rPr lang="en-US" dirty="0"/>
+              <a:t>Project release cadence</a:t>
+            </a:r>
+          </a:p>
+          <a:p>
+            <a:r>
+              <a:rPr lang="en-US" dirty="0"/>
+              <a:t>Project review and verification</a:t>
+            </a:r>
+          </a:p>
+          <a:p>
+            <a:r>
+              <a:rPr lang="en-US" dirty="0"/>
+              <a:t>Transition ongoing development and support to the client or to your support organization</a:t>
+            </a:r>
+          </a:p>
+          <a:p>
             <a:r>
               <a:rPr lang="en-US" b="1" u="sng" dirty="0"/>
-              <a:t>working</a:t>
-            </a:r>
-            <a:r>
-              <a:rPr lang="en-US" dirty="0"/>
-              <a:t> download links for all required software</a:t>
-            </a:r>
-          </a:p>
-          <a:p>
-            <a:r>
-              <a:rPr lang="en-US" dirty="0"/>
-              <a:t>Provide </a:t>
-            </a:r>
-            <a:r>
-              <a:rPr lang="en-US" b="1" u="sng" dirty="0"/>
-              <a:t>working</a:t>
-            </a:r>
-            <a:r>
-              <a:rPr lang="en-US" dirty="0"/>
-              <a:t> links for all online tools</a:t>
-            </a:r>
-          </a:p>
-          <a:p>
-            <a:r>
-              <a:rPr lang="en-US" dirty="0"/>
-              <a:t>Provide installation and access instructions for all software, servers, databases and tools</a:t>
-            </a:r>
-          </a:p>
-          <a:p>
-            <a:r>
-              <a:rPr lang="en-US" dirty="0"/>
-              <a:t>Provide license request instructions as needed</a:t>
-            </a:r>
-          </a:p>
-          <a:p>
-            <a:r>
-              <a:rPr lang="en-US" dirty="0"/>
-              <a:t>Use a document format that is easily editable and shareable</a:t>
-            </a:r>
-          </a:p>
-          <a:p>
-            <a:r>
-              <a:rPr lang="en-US" dirty="0"/>
-              <a:t>Adhere to DRY principle</a:t>
+              <a:t>Documentation is part of your software deliverable</a:t>
             </a:r>
           </a:p>
           <a:p>
@@ -6402,7 +6453,7 @@
     </p:spTree>
     <p:extLst>
       <p:ext uri="{BB962C8B-B14F-4D97-AF65-F5344CB8AC3E}">
-        <p14:creationId xmlns:p14="http://schemas.microsoft.com/office/powerpoint/2010/main" val="1776371180"/>
+        <p14:creationId xmlns:p14="http://schemas.microsoft.com/office/powerpoint/2010/main" val="1019005265"/>
       </p:ext>
     </p:extLst>
   </p:cSld>
@@ -6448,7 +6499,7 @@
           <a:p>
             <a:r>
               <a:rPr lang="en-US" dirty="0"/>
-              <a:t>What needs to be covered?</a:t>
+              <a:t>Guidelines</a:t>
             </a:r>
           </a:p>
         </p:txBody>
@@ -6466,53 +6517,138 @@
         <p:spPr/>
         <p:txBody>
           <a:bodyPr>
-            <a:normAutofit lnSpcReduction="10000"/>
+            <a:normAutofit fontScale="77500" lnSpcReduction="20000"/>
           </a:bodyPr>
           <a:lstStyle/>
           <a:p>
             <a:r>
               <a:rPr lang="en-US" dirty="0"/>
-              <a:t>Contact info and responsibilities for all team members</a:t>
+              <a:t>Be specific and limit options</a:t>
             </a:r>
           </a:p>
           <a:p>
             <a:pPr lvl="1"/>
             <a:r>
               <a:rPr lang="en-US" dirty="0"/>
-              <a:t>Include project owner/sponsor, PMs, Scrum Masters, BAs, Developers, QA, IT support</a:t>
+              <a:t>Ambiguity is </a:t>
+            </a:r>
+            <a:r>
+              <a:rPr lang="en-US" b="1" u="sng" dirty="0">
+                <a:solidFill>
+                  <a:srgbClr val="FF0000"/>
+                </a:solidFill>
+              </a:rPr>
+              <a:t>BAD</a:t>
+            </a:r>
+            <a:r>
+              <a:rPr lang="en-US" dirty="0">
+                <a:solidFill>
+                  <a:srgbClr val="FF0000"/>
+                </a:solidFill>
+              </a:rPr>
+              <a:t> 🤔</a:t>
             </a:r>
           </a:p>
           <a:p>
             <a:pPr lvl="1"/>
             <a:r>
               <a:rPr lang="en-US" dirty="0"/>
-              <a:t>Include email, phone numbers, desk locations</a:t>
-            </a:r>
-          </a:p>
-          <a:p>
-            <a:r>
-              <a:rPr lang="en-US" dirty="0"/>
-              <a:t>Links to project requirements</a:t>
-            </a:r>
-          </a:p>
-          <a:p>
-            <a:r>
-              <a:rPr lang="en-US" dirty="0"/>
-              <a:t>Links to architecture and design docs</a:t>
-            </a:r>
-          </a:p>
-          <a:p>
-            <a:r>
-              <a:rPr lang="en-US" dirty="0"/>
-              <a:t>Project management/issue tracking software/tools</a:t>
-            </a:r>
+              <a:t>Multiple options </a:t>
+            </a:r>
+            <a:r>
+              <a:rPr lang="en-US" b="1" u="sng" dirty="0">
+                <a:solidFill>
+                  <a:srgbClr val="FF0000"/>
+                </a:solidFill>
+              </a:rPr>
+              <a:t>can be worse</a:t>
+            </a:r>
+            <a:r>
+              <a:rPr lang="en-US" b="1" dirty="0">
+                <a:solidFill>
+                  <a:srgbClr val="FF0000"/>
+                </a:solidFill>
+              </a:rPr>
+              <a:t> </a:t>
+            </a:r>
+            <a:r>
+              <a:rPr lang="en-US" dirty="0"/>
+              <a:t>😳</a:t>
+            </a:r>
+            <a:endParaRPr lang="en-US" b="1" u="sng" dirty="0">
+              <a:solidFill>
+                <a:srgbClr val="FF0000"/>
+              </a:solidFill>
+            </a:endParaRPr>
+          </a:p>
+          <a:p>
+            <a:pPr lvl="1"/>
+            <a:r>
+              <a:rPr lang="en-US" dirty="0"/>
+              <a:t>Helps eliminate "it works on my machine" ☹️</a:t>
+            </a:r>
+          </a:p>
+          <a:p>
+            <a:r>
+              <a:rPr lang="en-US" dirty="0"/>
+              <a:t>Provide </a:t>
+            </a:r>
+            <a:r>
+              <a:rPr lang="en-US" b="1" u="sng" dirty="0"/>
+              <a:t>working</a:t>
+            </a:r>
+            <a:r>
+              <a:rPr lang="en-US" dirty="0"/>
+              <a:t> download links for all required software</a:t>
+            </a:r>
+          </a:p>
+          <a:p>
+            <a:r>
+              <a:rPr lang="en-US" dirty="0"/>
+              <a:t>Provide </a:t>
+            </a:r>
+            <a:r>
+              <a:rPr lang="en-US" b="1" u="sng" dirty="0"/>
+              <a:t>working</a:t>
+            </a:r>
+            <a:r>
+              <a:rPr lang="en-US" dirty="0"/>
+              <a:t> links for all online tools</a:t>
+            </a:r>
+          </a:p>
+          <a:p>
+            <a:r>
+              <a:rPr lang="en-US" dirty="0"/>
+              <a:t>Provide installation and access instructions for all software, servers, databases and tools</a:t>
+            </a:r>
+          </a:p>
+          <a:p>
+            <a:r>
+              <a:rPr lang="en-US" dirty="0"/>
+              <a:t>Provide license request instructions as needed</a:t>
+            </a:r>
+          </a:p>
+          <a:p>
+            <a:r>
+              <a:rPr lang="en-US" dirty="0"/>
+              <a:t>Use a document format that is easily editable and shareable</a:t>
+            </a:r>
+          </a:p>
+          <a:p>
+            <a:r>
+              <a:rPr lang="en-US" dirty="0"/>
+              <a:t>Adhere to DRY principle</a:t>
+            </a:r>
+          </a:p>
+          <a:p>
+            <a:endParaRPr lang="en-US" dirty="0"/>
           </a:p>
         </p:txBody>
       </p:sp>
     </p:spTree>
     <p:extLst>
       <p:ext uri="{BB962C8B-B14F-4D97-AF65-F5344CB8AC3E}">
-        <p14:creationId xmlns:p14="http://schemas.microsoft.com/office/powerpoint/2010/main" val="1178388904"/>
+        <p14:creationId xmlns:p14="http://schemas.microsoft.com/office/powerpoint/2010/main" val="1776371180"/>
       </p:ext>
     </p:extLst>
   </p:cSld>

</xml_diff>

<commit_message>
One more Columbus Code Camp 2017 update
</commit_message>
<xml_diff>
--- a/Living on borrowed time; or Dude, where are the docs.pptx
+++ b/Living on borrowed time; or Dude, where are the docs.pptx
@@ -10,9 +10,9 @@
   <p:sldIdLst>
     <p:sldId id="315" r:id="rId2"/>
     <p:sldId id="258" r:id="rId3"/>
-    <p:sldId id="321" r:id="rId4"/>
-    <p:sldId id="306" r:id="rId5"/>
-    <p:sldId id="320" r:id="rId6"/>
+    <p:sldId id="306" r:id="rId4"/>
+    <p:sldId id="320" r:id="rId5"/>
+    <p:sldId id="321" r:id="rId6"/>
     <p:sldId id="307" r:id="rId7"/>
     <p:sldId id="319" r:id="rId8"/>
     <p:sldId id="308" r:id="rId9"/>
@@ -225,7 +225,7 @@
           <a:p>
             <a:fld id="{DE4C9721-1813-4A55-A5DA-76417DB5EE62}" type="datetimeFigureOut">
               <a:rPr lang="en-US" smtClean="0"/>
-              <a:t>10/10/17</a:t>
+              <a:t>10/14/17</a:t>
             </a:fld>
             <a:endParaRPr lang="en-US"/>
           </a:p>
@@ -694,7 +694,7 @@
           <a:p>
             <a:fld id="{E5D4B8C3-E62F-4D90-96E6-3B107CCE0282}" type="slidenum">
               <a:rPr lang="en-US" smtClean="0"/>
-              <a:t>4</a:t>
+              <a:t>3</a:t>
             </a:fld>
             <a:endParaRPr lang="en-US"/>
           </a:p>
@@ -758,6 +758,102 @@
           <a:lstStyle/>
           <a:p>
             <a:r>
+              <a:rPr lang="en-US" sz="1200" b="0" i="0" kern="1200" dirty="0">
+                <a:solidFill>
+                  <a:schemeClr val="tx1"/>
+                </a:solidFill>
+                <a:effectLst/>
+                <a:latin typeface="+mn-lt"/>
+                <a:ea typeface="+mn-ea"/>
+                <a:cs typeface="+mn-cs"/>
+              </a:rPr>
+              <a:t>Jeffrey Lebowski</a:t>
+            </a:r>
+            <a:endParaRPr lang="en-US" dirty="0"/>
+          </a:p>
+        </p:txBody>
+      </p:sp>
+      <p:sp>
+        <p:nvSpPr>
+          <p:cNvPr id="4" name="Slide Number Placeholder 3"/>
+          <p:cNvSpPr>
+            <a:spLocks noGrp="1"/>
+          </p:cNvSpPr>
+          <p:nvPr>
+            <p:ph type="sldNum" sz="quarter" idx="10"/>
+          </p:nvPr>
+        </p:nvSpPr>
+        <p:spPr/>
+        <p:txBody>
+          <a:bodyPr/>
+          <a:lstStyle/>
+          <a:p>
+            <a:fld id="{E5D4B8C3-E62F-4D90-96E6-3B107CCE0282}" type="slidenum">
+              <a:rPr lang="en-US" smtClean="0"/>
+              <a:t>5</a:t>
+            </a:fld>
+            <a:endParaRPr lang="en-US"/>
+          </a:p>
+        </p:txBody>
+      </p:sp>
+    </p:spTree>
+    <p:extLst>
+      <p:ext uri="{BB962C8B-B14F-4D97-AF65-F5344CB8AC3E}">
+        <p14:creationId xmlns:p14="http://schemas.microsoft.com/office/powerpoint/2010/main" val="3848643391"/>
+      </p:ext>
+    </p:extLst>
+  </p:cSld>
+  <p:clrMapOvr>
+    <a:masterClrMapping/>
+  </p:clrMapOvr>
+</p:notes>
+</file>
+
+<file path=ppt/notesSlides/notesSlide4.xml><?xml version="1.0" encoding="utf-8"?>
+<p:notes xmlns:a="http://schemas.openxmlformats.org/drawingml/2006/main" xmlns:r="http://schemas.openxmlformats.org/officeDocument/2006/relationships" xmlns:p="http://schemas.openxmlformats.org/presentationml/2006/main">
+  <p:cSld>
+    <p:spTree>
+      <p:nvGrpSpPr>
+        <p:cNvPr id="1" name=""/>
+        <p:cNvGrpSpPr/>
+        <p:nvPr/>
+      </p:nvGrpSpPr>
+      <p:grpSpPr>
+        <a:xfrm>
+          <a:off x="0" y="0"/>
+          <a:ext cx="0" cy="0"/>
+          <a:chOff x="0" y="0"/>
+          <a:chExt cx="0" cy="0"/>
+        </a:xfrm>
+      </p:grpSpPr>
+      <p:sp>
+        <p:nvSpPr>
+          <p:cNvPr id="2" name="Slide Image Placeholder 1"/>
+          <p:cNvSpPr>
+            <a:spLocks noGrp="1" noRot="1" noChangeAspect="1"/>
+          </p:cNvSpPr>
+          <p:nvPr>
+            <p:ph type="sldImg"/>
+          </p:nvPr>
+        </p:nvSpPr>
+        <p:spPr/>
+      </p:sp>
+      <p:sp>
+        <p:nvSpPr>
+          <p:cNvPr id="3" name="Notes Placeholder 2"/>
+          <p:cNvSpPr>
+            <a:spLocks noGrp="1"/>
+          </p:cNvSpPr>
+          <p:nvPr>
+            <p:ph type="body" idx="1"/>
+          </p:nvPr>
+        </p:nvSpPr>
+        <p:spPr/>
+        <p:txBody>
+          <a:bodyPr/>
+          <a:lstStyle/>
+          <a:p>
+            <a:r>
               <a:rPr lang="en-US" dirty="0"/>
               <a:t>Using VM technology can significantly</a:t>
             </a:r>
@@ -805,7 +901,7 @@
 </p:notes>
 </file>
 
-<file path=ppt/notesSlides/notesSlide4.xml><?xml version="1.0" encoding="utf-8"?>
+<file path=ppt/notesSlides/notesSlide5.xml><?xml version="1.0" encoding="utf-8"?>
 <p:notes xmlns:a="http://schemas.openxmlformats.org/drawingml/2006/main" xmlns:r="http://schemas.openxmlformats.org/officeDocument/2006/relationships" xmlns:p="http://schemas.openxmlformats.org/presentationml/2006/main">
   <p:cSld>
     <p:spTree>
@@ -1114,7 +1210,7 @@
           <a:p>
             <a:fld id="{1A6A9824-C09F-4166-9A2C-6C9FA577887A}" type="datetimeFigureOut">
               <a:rPr lang="en-US" smtClean="0"/>
-              <a:t>10/10/17</a:t>
+              <a:t>10/14/17</a:t>
             </a:fld>
             <a:endParaRPr lang="en-US"/>
           </a:p>
@@ -1322,7 +1418,7 @@
           <a:p>
             <a:fld id="{2A7CB402-B72D-3346-9EA5-354251120F9E}" type="datetimeFigureOut">
               <a:rPr lang="en-US" smtClean="0"/>
-              <a:t>10/10/17</a:t>
+              <a:t>10/14/17</a:t>
             </a:fld>
             <a:endParaRPr lang="en-US"/>
           </a:p>
@@ -1481,7 +1577,7 @@
           <a:p>
             <a:fld id="{2A7CB402-B72D-3346-9EA5-354251120F9E}" type="datetimeFigureOut">
               <a:rPr lang="en-US" smtClean="0"/>
-              <a:t>10/10/17</a:t>
+              <a:t>10/14/17</a:t>
             </a:fld>
             <a:endParaRPr lang="en-US"/>
           </a:p>
@@ -1702,7 +1798,7 @@
           <a:p>
             <a:fld id="{2A7CB402-B72D-3346-9EA5-354251120F9E}" type="datetimeFigureOut">
               <a:rPr lang="en-US" smtClean="0"/>
-              <a:t>10/10/17</a:t>
+              <a:t>10/14/17</a:t>
             </a:fld>
             <a:endParaRPr lang="en-US"/>
           </a:p>
@@ -2041,7 +2137,7 @@
           <a:p>
             <a:fld id="{2A7CB402-B72D-3346-9EA5-354251120F9E}" type="datetimeFigureOut">
               <a:rPr lang="en-US" smtClean="0"/>
-              <a:t>10/10/17</a:t>
+              <a:t>10/14/17</a:t>
             </a:fld>
             <a:endParaRPr lang="en-US"/>
           </a:p>
@@ -2417,7 +2513,7 @@
           <a:p>
             <a:fld id="{2A7CB402-B72D-3346-9EA5-354251120F9E}" type="datetimeFigureOut">
               <a:rPr lang="en-US" smtClean="0"/>
-              <a:t>10/10/17</a:t>
+              <a:t>10/14/17</a:t>
             </a:fld>
             <a:endParaRPr lang="en-US"/>
           </a:p>
@@ -2930,7 +3026,7 @@
           <a:p>
             <a:fld id="{2A7CB402-B72D-3346-9EA5-354251120F9E}" type="datetimeFigureOut">
               <a:rPr lang="en-US" smtClean="0"/>
-              <a:t>10/10/17</a:t>
+              <a:t>10/14/17</a:t>
             </a:fld>
             <a:endParaRPr lang="en-US"/>
           </a:p>
@@ -3097,7 +3193,7 @@
           <a:p>
             <a:fld id="{2A7CB402-B72D-3346-9EA5-354251120F9E}" type="datetimeFigureOut">
               <a:rPr lang="en-US" smtClean="0"/>
-              <a:t>10/10/17</a:t>
+              <a:t>10/14/17</a:t>
             </a:fld>
             <a:endParaRPr lang="en-US"/>
           </a:p>
@@ -3227,7 +3323,7 @@
           <a:p>
             <a:fld id="{2A7CB402-B72D-3346-9EA5-354251120F9E}" type="datetimeFigureOut">
               <a:rPr lang="en-US" smtClean="0"/>
-              <a:t>10/10/17</a:t>
+              <a:t>10/14/17</a:t>
             </a:fld>
             <a:endParaRPr lang="en-US"/>
           </a:p>
@@ -3574,7 +3670,7 @@
           <a:p>
             <a:fld id="{2A7CB402-B72D-3346-9EA5-354251120F9E}" type="datetimeFigureOut">
               <a:rPr lang="en-US" smtClean="0"/>
-              <a:t>10/10/17</a:t>
+              <a:t>10/14/17</a:t>
             </a:fld>
             <a:endParaRPr lang="en-US"/>
           </a:p>
@@ -3886,7 +3982,7 @@
           <a:p>
             <a:fld id="{2A7CB402-B72D-3346-9EA5-354251120F9E}" type="datetimeFigureOut">
               <a:rPr lang="en-US" smtClean="0"/>
-              <a:t>10/10/17</a:t>
+              <a:t>10/14/17</a:t>
             </a:fld>
             <a:endParaRPr lang="en-US"/>
           </a:p>
@@ -4109,7 +4205,7 @@
           <a:p>
             <a:fld id="{2A7CB402-B72D-3346-9EA5-354251120F9E}" type="datetimeFigureOut">
               <a:rPr lang="en-US" smtClean="0"/>
-              <a:t>10/10/17</a:t>
+              <a:t>10/14/17</a:t>
             </a:fld>
             <a:endParaRPr lang="en-US"/>
           </a:p>
@@ -5745,13 +5841,7 @@
       </p:grpSpPr>
       <p:sp>
         <p:nvSpPr>
-          <p:cNvPr id="2" name="Title 1">
-            <a:extLst>
-              <a:ext uri="{FF2B5EF4-FFF2-40B4-BE49-F238E27FC236}">
-                <a16:creationId xmlns:a16="http://schemas.microsoft.com/office/drawing/2014/main" id="{09582F26-A757-624D-8961-35EA1E30F7E7}"/>
-              </a:ext>
-            </a:extLst>
-          </p:cNvPr>
+          <p:cNvPr id="2" name="Title 1"/>
           <p:cNvSpPr>
             <a:spLocks noGrp="1"/>
           </p:cNvSpPr>
@@ -5768,20 +5858,14 @@
           <a:p>
             <a:r>
               <a:rPr lang="en-US" dirty="0"/>
-              <a:t>Dude?!?!</a:t>
-            </a:r>
-          </a:p>
-        </p:txBody>
-      </p:sp>
-      <p:sp>
-        <p:nvSpPr>
-          <p:cNvPr id="3" name="Content Placeholder 2">
-            <a:extLst>
-              <a:ext uri="{FF2B5EF4-FFF2-40B4-BE49-F238E27FC236}">
-                <a16:creationId xmlns:a16="http://schemas.microsoft.com/office/drawing/2014/main" id="{A28DBFEC-0883-E14C-B3AA-CB3FE4EE5868}"/>
-              </a:ext>
-            </a:extLst>
-          </p:cNvPr>
+              <a:t>Introduction</a:t>
+            </a:r>
+          </a:p>
+        </p:txBody>
+      </p:sp>
+      <p:sp>
+        <p:nvSpPr>
+          <p:cNvPr id="3" name="Content Placeholder 2"/>
           <p:cNvSpPr>
             <a:spLocks noGrp="1"/>
           </p:cNvSpPr>
@@ -5792,60 +5876,52 @@
         <p:spPr/>
         <p:txBody>
           <a:bodyPr>
-            <a:normAutofit/>
+            <a:normAutofit fontScale="85000" lnSpcReduction="10000"/>
           </a:bodyPr>
           <a:lstStyle/>
           <a:p>
-            <a:pPr marL="0" indent="0">
-              <a:buNone/>
-            </a:pPr>
-            <a:r>
-              <a:rPr lang="en-US" sz="4000" dirty="0"/>
-              <a:t> </a:t>
-            </a:r>
-          </a:p>
-        </p:txBody>
-      </p:sp>
-      <p:pic>
-        <p:nvPicPr>
-          <p:cNvPr id="5" name="Picture 4">
-            <a:extLst>
-              <a:ext uri="{FF2B5EF4-FFF2-40B4-BE49-F238E27FC236}">
-                <a16:creationId xmlns:a16="http://schemas.microsoft.com/office/drawing/2014/main" id="{4B57728B-A314-3247-8573-E9507DAE141E}"/>
-              </a:ext>
-            </a:extLst>
-          </p:cNvPr>
-          <p:cNvPicPr>
-            <a:picLocks noChangeAspect="1"/>
-          </p:cNvPicPr>
-          <p:nvPr/>
-        </p:nvPicPr>
-        <p:blipFill>
-          <a:blip r:embed="rId2">
-            <a:extLst>
-              <a:ext uri="{28A0092B-C50C-407E-A947-70E740481C1C}">
-                <a14:useLocalDpi xmlns:a14="http://schemas.microsoft.com/office/drawing/2010/main" val="0"/>
-              </a:ext>
-            </a:extLst>
-          </a:blip>
-          <a:stretch>
-            <a:fillRect/>
-          </a:stretch>
-        </p:blipFill>
-        <p:spPr>
-          <a:xfrm>
-            <a:off x="2309018" y="1143000"/>
-            <a:ext cx="4525963" cy="4525963"/>
-          </a:xfrm>
-          <a:prstGeom prst="rect">
-            <a:avLst/>
-          </a:prstGeom>
-        </p:spPr>
-      </p:pic>
+            <a:r>
+              <a:rPr lang="en-US" dirty="0"/>
+              <a:t>28+ year career (I'm getting old)</a:t>
+            </a:r>
+          </a:p>
+          <a:p>
+            <a:r>
+              <a:rPr lang="en-US" dirty="0"/>
+              <a:t>Several development projects for multiple companies</a:t>
+            </a:r>
+          </a:p>
+          <a:p>
+            <a:pPr lvl="1"/>
+            <a:r>
+              <a:rPr lang="en-US" dirty="0"/>
+              <a:t>IBM, Lexmark, Diebold, Limited Brands, Sterling Commerce, IBM (again), Leading EDJE, Crown Equipment Corp, Wendy's, Improving, Ohio State, Abercrombie &amp; Fitch</a:t>
+            </a:r>
+          </a:p>
+          <a:p>
+            <a:r>
+              <a:rPr lang="en-US" dirty="0"/>
+              <a:t>Worked on several projects with effective documentation 😃</a:t>
+            </a:r>
+          </a:p>
+          <a:p>
+            <a:r>
+              <a:rPr lang="en-US" dirty="0"/>
+              <a:t>Worked on several projects where there was little to no documentation (and wrote docs for them)😢</a:t>
+            </a:r>
+          </a:p>
+          <a:p>
+            <a:r>
+              <a:rPr lang="en-US" dirty="0"/>
+              <a:t>Who are you?</a:t>
+            </a:r>
+          </a:p>
+        </p:txBody>
+      </p:sp>
     </p:spTree>
     <p:extLst>
       <p:ext uri="{BB962C8B-B14F-4D97-AF65-F5344CB8AC3E}">
-        <p14:creationId xmlns:p14="http://schemas.microsoft.com/office/powerpoint/2010/main" val="3311894362"/>
+        <p14:creationId xmlns:p14="http://schemas.microsoft.com/office/powerpoint/2010/main" val="836982972"/>
       </p:ext>
     </p:extLst>
   </p:cSld>
@@ -5890,8 +5966,8 @@
           <a:lstStyle/>
           <a:p>
             <a:r>
-              <a:rPr lang="en-US" dirty="0"/>
-              <a:t>Introduction</a:t>
+              <a:rPr lang="en-US"/>
+              <a:t>About Improving</a:t>
             </a:r>
           </a:p>
         </p:txBody>
@@ -5909,52 +5985,77 @@
         <p:spPr/>
         <p:txBody>
           <a:bodyPr>
-            <a:normAutofit fontScale="85000" lnSpcReduction="10000"/>
+            <a:normAutofit fontScale="85000" lnSpcReduction="20000"/>
           </a:bodyPr>
           <a:lstStyle/>
           <a:p>
-            <a:r>
-              <a:rPr lang="en-US" dirty="0"/>
-              <a:t>28+ year career (I'm getting old)</a:t>
-            </a:r>
-          </a:p>
-          <a:p>
-            <a:r>
-              <a:rPr lang="en-US" dirty="0"/>
-              <a:t>Several development projects for multiple companies</a:t>
-            </a:r>
-          </a:p>
-          <a:p>
-            <a:pPr lvl="1"/>
-            <a:r>
-              <a:rPr lang="en-US" dirty="0"/>
-              <a:t>IBM, Lexmark, Diebold, Limited Brands, Sterling Commerce, IBM (again), Leading EDJE, Crown Equipment Corp, Wendy's, Improving, Ohio State, Abercrombie &amp; Fitch</a:t>
-            </a:r>
-          </a:p>
-          <a:p>
-            <a:r>
-              <a:rPr lang="en-US" dirty="0"/>
-              <a:t>Worked on several projects with effective documentation 😃</a:t>
-            </a:r>
-          </a:p>
-          <a:p>
-            <a:r>
-              <a:rPr lang="en-US" dirty="0"/>
-              <a:t>Worked on several projects where there was little to no documentation (and wrote docs for them)😢</a:t>
-            </a:r>
-          </a:p>
-          <a:p>
-            <a:r>
-              <a:rPr lang="en-US" dirty="0"/>
-              <a:t>Who are you?</a:t>
-            </a:r>
+            <a:pPr marL="0" indent="0">
+              <a:buNone/>
+            </a:pPr>
+            <a:r>
+              <a:rPr lang="en-US" sz="4300" dirty="0"/>
+              <a:t>Creating a great place to work by</a:t>
+            </a:r>
+            <a:r>
+              <a:rPr lang="en-US" dirty="0"/>
+              <a:t> </a:t>
+            </a:r>
+          </a:p>
+          <a:p>
+            <a:pPr fontAlgn="auto"/>
+            <a:r>
+              <a:rPr lang="en-US" dirty="0"/>
+              <a:t>Cultivating an environment that fosters authentic and long term professional relationships </a:t>
+            </a:r>
+          </a:p>
+          <a:p>
+            <a:pPr fontAlgn="auto"/>
+            <a:r>
+              <a:rPr lang="en-US" dirty="0"/>
+              <a:t>Sharing the success and accomplishments of the company </a:t>
+            </a:r>
+          </a:p>
+          <a:p>
+            <a:pPr fontAlgn="auto"/>
+            <a:r>
+              <a:rPr lang="en-US" dirty="0"/>
+              <a:t>Promoting open and honest communication </a:t>
+            </a:r>
+          </a:p>
+          <a:p>
+            <a:pPr fontAlgn="auto"/>
+            <a:r>
+              <a:rPr lang="en-US" dirty="0"/>
+              <a:t>Providing creative ways for each of us to learn and grow </a:t>
+            </a:r>
+          </a:p>
+          <a:p>
+            <a:pPr fontAlgn="auto"/>
+            <a:r>
+              <a:rPr lang="en-US" dirty="0"/>
+              <a:t>Encouraging a positive atmosphere which is both friendly and fun</a:t>
+            </a:r>
+          </a:p>
+          <a:p>
+            <a:pPr fontAlgn="auto"/>
+            <a:r>
+              <a:rPr lang="en-US" dirty="0"/>
+              <a:t>We </a:t>
+            </a:r>
+            <a:r>
+              <a:rPr lang="en-US"/>
+              <a:t>are hiring!</a:t>
+            </a:r>
+          </a:p>
+          <a:p>
+            <a:endParaRPr lang="en-US" dirty="0"/>
           </a:p>
         </p:txBody>
       </p:sp>
     </p:spTree>
     <p:extLst>
       <p:ext uri="{BB962C8B-B14F-4D97-AF65-F5344CB8AC3E}">
-        <p14:creationId xmlns:p14="http://schemas.microsoft.com/office/powerpoint/2010/main" val="836982972"/>
+        <p14:creationId xmlns:p14="http://schemas.microsoft.com/office/powerpoint/2010/main" val="1411089625"/>
       </p:ext>
     </p:extLst>
   </p:cSld>
@@ -5983,7 +6084,13 @@
       </p:grpSpPr>
       <p:sp>
         <p:nvSpPr>
-          <p:cNvPr id="2" name="Title 1"/>
+          <p:cNvPr id="2" name="Title 1">
+            <a:extLst>
+              <a:ext uri="{FF2B5EF4-FFF2-40B4-BE49-F238E27FC236}">
+                <a16:creationId xmlns:a16="http://schemas.microsoft.com/office/drawing/2014/main" id="{09582F26-A757-624D-8961-35EA1E30F7E7}"/>
+              </a:ext>
+            </a:extLst>
+          </p:cNvPr>
           <p:cNvSpPr>
             <a:spLocks noGrp="1"/>
           </p:cNvSpPr>
@@ -5999,15 +6106,21 @@
           <a:lstStyle/>
           <a:p>
             <a:r>
-              <a:rPr lang="en-US"/>
-              <a:t>About Improving</a:t>
-            </a:r>
-          </a:p>
-        </p:txBody>
-      </p:sp>
-      <p:sp>
-        <p:nvSpPr>
-          <p:cNvPr id="3" name="Content Placeholder 2"/>
+              <a:rPr lang="en-US" dirty="0"/>
+              <a:t>Dude?!?!</a:t>
+            </a:r>
+          </a:p>
+        </p:txBody>
+      </p:sp>
+      <p:sp>
+        <p:nvSpPr>
+          <p:cNvPr id="3" name="Content Placeholder 2">
+            <a:extLst>
+              <a:ext uri="{FF2B5EF4-FFF2-40B4-BE49-F238E27FC236}">
+                <a16:creationId xmlns:a16="http://schemas.microsoft.com/office/drawing/2014/main" id="{A28DBFEC-0883-E14C-B3AA-CB3FE4EE5868}"/>
+              </a:ext>
+            </a:extLst>
+          </p:cNvPr>
           <p:cNvSpPr>
             <a:spLocks noGrp="1"/>
           </p:cNvSpPr>
@@ -6018,7 +6131,7 @@
         <p:spPr/>
         <p:txBody>
           <a:bodyPr>
-            <a:normAutofit fontScale="92500" lnSpcReduction="20000"/>
+            <a:normAutofit/>
           </a:bodyPr>
           <a:lstStyle/>
           <a:p>
@@ -6026,58 +6139,52 @@
               <a:buNone/>
             </a:pPr>
             <a:r>
-              <a:rPr lang="en-US" sz="4300"/>
-              <a:t>Creating a great place to work by</a:t>
-            </a:r>
-            <a:r>
-              <a:rPr lang="en-US"/>
+              <a:rPr lang="en-US" sz="4000" dirty="0"/>
               <a:t> </a:t>
             </a:r>
           </a:p>
-          <a:p>
-            <a:pPr fontAlgn="auto"/>
-            <a:r>
-              <a:rPr lang="en-US"/>
-              <a:t>Cultivating an environment that fosters authentic and long term professional relationships </a:t>
-            </a:r>
-          </a:p>
-          <a:p>
-            <a:pPr fontAlgn="auto"/>
-            <a:r>
-              <a:rPr lang="en-US"/>
-              <a:t>Sharing the success and accomplishments of the company </a:t>
-            </a:r>
-          </a:p>
-          <a:p>
-            <a:pPr fontAlgn="auto"/>
-            <a:r>
-              <a:rPr lang="en-US"/>
-              <a:t>Promoting open and honest communication </a:t>
-            </a:r>
-          </a:p>
-          <a:p>
-            <a:pPr fontAlgn="auto"/>
-            <a:r>
-              <a:rPr lang="en-US"/>
-              <a:t>Providing creative ways for each of us to learn and grow </a:t>
-            </a:r>
-          </a:p>
-          <a:p>
-            <a:pPr fontAlgn="auto"/>
-            <a:r>
-              <a:rPr lang="en-US"/>
-              <a:t>Encouraging a positive atmosphere which is both friendly and fun </a:t>
-            </a:r>
-          </a:p>
-          <a:p>
-            <a:endParaRPr lang="en-US"/>
-          </a:p>
-        </p:txBody>
-      </p:sp>
+        </p:txBody>
+      </p:sp>
+      <p:pic>
+        <p:nvPicPr>
+          <p:cNvPr id="5" name="Picture 4">
+            <a:extLst>
+              <a:ext uri="{FF2B5EF4-FFF2-40B4-BE49-F238E27FC236}">
+                <a16:creationId xmlns:a16="http://schemas.microsoft.com/office/drawing/2014/main" id="{4B57728B-A314-3247-8573-E9507DAE141E}"/>
+              </a:ext>
+            </a:extLst>
+          </p:cNvPr>
+          <p:cNvPicPr>
+            <a:picLocks noChangeAspect="1"/>
+          </p:cNvPicPr>
+          <p:nvPr/>
+        </p:nvPicPr>
+        <p:blipFill>
+          <a:blip r:embed="rId3">
+            <a:extLst>
+              <a:ext uri="{28A0092B-C50C-407E-A947-70E740481C1C}">
+                <a14:useLocalDpi xmlns:a14="http://schemas.microsoft.com/office/drawing/2010/main" val="0"/>
+              </a:ext>
+            </a:extLst>
+          </a:blip>
+          <a:stretch>
+            <a:fillRect/>
+          </a:stretch>
+        </p:blipFill>
+        <p:spPr>
+          <a:xfrm>
+            <a:off x="2309018" y="1143000"/>
+            <a:ext cx="4525963" cy="4525963"/>
+          </a:xfrm>
+          <a:prstGeom prst="rect">
+            <a:avLst/>
+          </a:prstGeom>
+        </p:spPr>
+      </p:pic>
     </p:spTree>
     <p:extLst>
       <p:ext uri="{BB962C8B-B14F-4D97-AF65-F5344CB8AC3E}">
-        <p14:creationId xmlns:p14="http://schemas.microsoft.com/office/powerpoint/2010/main" val="1411089625"/>
+        <p14:creationId xmlns:p14="http://schemas.microsoft.com/office/powerpoint/2010/main" val="3311894362"/>
       </p:ext>
     </p:extLst>
   </p:cSld>

</xml_diff>

<commit_message>
Add new version of documentation presentation
</commit_message>
<xml_diff>
--- a/Living on borrowed time; or Dude, where are the docs.pptx
+++ b/Living on borrowed time; or Dude, where are the docs.pptx
@@ -225,7 +225,7 @@
           <a:p>
             <a:fld id="{DE4C9721-1813-4A55-A5DA-76417DB5EE62}" type="datetimeFigureOut">
               <a:rPr lang="en-US" smtClean="0"/>
-              <a:t>10/14/17</a:t>
+              <a:t>7/23/25</a:t>
             </a:fld>
             <a:endParaRPr lang="en-US"/>
           </a:p>
@@ -1210,7 +1210,7 @@
           <a:p>
             <a:fld id="{1A6A9824-C09F-4166-9A2C-6C9FA577887A}" type="datetimeFigureOut">
               <a:rPr lang="en-US" smtClean="0"/>
-              <a:t>10/14/17</a:t>
+              <a:t>7/23/25</a:t>
             </a:fld>
             <a:endParaRPr lang="en-US"/>
           </a:p>
@@ -1418,7 +1418,7 @@
           <a:p>
             <a:fld id="{2A7CB402-B72D-3346-9EA5-354251120F9E}" type="datetimeFigureOut">
               <a:rPr lang="en-US" smtClean="0"/>
-              <a:t>10/14/17</a:t>
+              <a:t>7/23/25</a:t>
             </a:fld>
             <a:endParaRPr lang="en-US"/>
           </a:p>
@@ -1577,7 +1577,7 @@
           <a:p>
             <a:fld id="{2A7CB402-B72D-3346-9EA5-354251120F9E}" type="datetimeFigureOut">
               <a:rPr lang="en-US" smtClean="0"/>
-              <a:t>10/14/17</a:t>
+              <a:t>7/23/25</a:t>
             </a:fld>
             <a:endParaRPr lang="en-US"/>
           </a:p>
@@ -1798,7 +1798,7 @@
           <a:p>
             <a:fld id="{2A7CB402-B72D-3346-9EA5-354251120F9E}" type="datetimeFigureOut">
               <a:rPr lang="en-US" smtClean="0"/>
-              <a:t>10/14/17</a:t>
+              <a:t>7/23/25</a:t>
             </a:fld>
             <a:endParaRPr lang="en-US"/>
           </a:p>
@@ -2137,7 +2137,7 @@
           <a:p>
             <a:fld id="{2A7CB402-B72D-3346-9EA5-354251120F9E}" type="datetimeFigureOut">
               <a:rPr lang="en-US" smtClean="0"/>
-              <a:t>10/14/17</a:t>
+              <a:t>7/23/25</a:t>
             </a:fld>
             <a:endParaRPr lang="en-US"/>
           </a:p>
@@ -2513,7 +2513,7 @@
           <a:p>
             <a:fld id="{2A7CB402-B72D-3346-9EA5-354251120F9E}" type="datetimeFigureOut">
               <a:rPr lang="en-US" smtClean="0"/>
-              <a:t>10/14/17</a:t>
+              <a:t>7/23/25</a:t>
             </a:fld>
             <a:endParaRPr lang="en-US"/>
           </a:p>
@@ -3026,7 +3026,7 @@
           <a:p>
             <a:fld id="{2A7CB402-B72D-3346-9EA5-354251120F9E}" type="datetimeFigureOut">
               <a:rPr lang="en-US" smtClean="0"/>
-              <a:t>10/14/17</a:t>
+              <a:t>7/23/25</a:t>
             </a:fld>
             <a:endParaRPr lang="en-US"/>
           </a:p>
@@ -3193,7 +3193,7 @@
           <a:p>
             <a:fld id="{2A7CB402-B72D-3346-9EA5-354251120F9E}" type="datetimeFigureOut">
               <a:rPr lang="en-US" smtClean="0"/>
-              <a:t>10/14/17</a:t>
+              <a:t>7/23/25</a:t>
             </a:fld>
             <a:endParaRPr lang="en-US"/>
           </a:p>
@@ -3323,7 +3323,7 @@
           <a:p>
             <a:fld id="{2A7CB402-B72D-3346-9EA5-354251120F9E}" type="datetimeFigureOut">
               <a:rPr lang="en-US" smtClean="0"/>
-              <a:t>10/14/17</a:t>
+              <a:t>7/23/25</a:t>
             </a:fld>
             <a:endParaRPr lang="en-US"/>
           </a:p>
@@ -3670,7 +3670,7 @@
           <a:p>
             <a:fld id="{2A7CB402-B72D-3346-9EA5-354251120F9E}" type="datetimeFigureOut">
               <a:rPr lang="en-US" smtClean="0"/>
-              <a:t>10/14/17</a:t>
+              <a:t>7/23/25</a:t>
             </a:fld>
             <a:endParaRPr lang="en-US"/>
           </a:p>
@@ -3982,7 +3982,7 @@
           <a:p>
             <a:fld id="{2A7CB402-B72D-3346-9EA5-354251120F9E}" type="datetimeFigureOut">
               <a:rPr lang="en-US" smtClean="0"/>
-              <a:t>10/14/17</a:t>
+              <a:t>7/23/25</a:t>
             </a:fld>
             <a:endParaRPr lang="en-US"/>
           </a:p>
@@ -4205,7 +4205,7 @@
           <a:p>
             <a:fld id="{2A7CB402-B72D-3346-9EA5-354251120F9E}" type="datetimeFigureOut">
               <a:rPr lang="en-US" smtClean="0"/>
-              <a:t>10/14/17</a:t>
+              <a:t>7/23/25</a:t>
             </a:fld>
             <a:endParaRPr lang="en-US"/>
           </a:p>
@@ -5966,7 +5966,7 @@
           <a:lstStyle/>
           <a:p>
             <a:r>
-              <a:rPr lang="en-US"/>
+              <a:rPr lang="en-US" dirty="0"/>
               <a:t>About Improving</a:t>
             </a:r>
           </a:p>
@@ -6293,6 +6293,9 @@
             </a:r>
           </a:p>
           <a:p>
+            <a:pPr marL="0" indent="0">
+              <a:buNone/>
+            </a:pPr>
             <a:r>
               <a:rPr lang="en-US" dirty="0"/>
               <a:t>This WILL save significant time! ⏱</a:t>

</xml_diff>